<commit_message>
Deployed c1a02413 with MkDocs version: 1.1.2
</commit_message>
<xml_diff>
--- a/presentations/Journey-Map.pptx
+++ b/presentations/Journey-Map.pptx
@@ -3341,6 +3341,21 @@
           <a:prstGeom prst="roundRect">
             <a:avLst/>
           </a:prstGeom>
+          <a:gradFill flip="none" rotWithShape="1">
+            <a:gsLst>
+              <a:gs pos="0">
+                <a:schemeClr val="accent1">
+                  <a:lumMod val="5000"/>
+                  <a:lumOff val="95000"/>
+                </a:schemeClr>
+              </a:gs>
+              <a:gs pos="100000">
+                <a:srgbClr val="0070C0"/>
+              </a:gs>
+            </a:gsLst>
+            <a:lin ang="2700000" scaled="1"/>
+            <a:tileRect/>
+          </a:gradFill>
           <a:ln/>
           <a:effectLst>
             <a:outerShdw blurRad="50800" dist="38100" dir="2700000" algn="tl" rotWithShape="0">
@@ -3411,6 +3426,21 @@
           <a:prstGeom prst="roundRect">
             <a:avLst/>
           </a:prstGeom>
+          <a:gradFill flip="none" rotWithShape="1">
+            <a:gsLst>
+              <a:gs pos="0">
+                <a:schemeClr val="accent1">
+                  <a:lumMod val="5000"/>
+                  <a:lumOff val="95000"/>
+                </a:schemeClr>
+              </a:gs>
+              <a:gs pos="100000">
+                <a:srgbClr val="0070C0"/>
+              </a:gs>
+            </a:gsLst>
+            <a:lin ang="2700000" scaled="1"/>
+            <a:tileRect/>
+          </a:gradFill>
           <a:ln/>
           <a:effectLst>
             <a:outerShdw blurRad="50800" dist="38100" dir="2700000" algn="tl" rotWithShape="0">
@@ -3481,6 +3511,21 @@
           <a:prstGeom prst="roundRect">
             <a:avLst/>
           </a:prstGeom>
+          <a:gradFill flip="none" rotWithShape="1">
+            <a:gsLst>
+              <a:gs pos="0">
+                <a:schemeClr val="accent1">
+                  <a:lumMod val="5000"/>
+                  <a:lumOff val="95000"/>
+                </a:schemeClr>
+              </a:gs>
+              <a:gs pos="100000">
+                <a:srgbClr val="0070C0"/>
+              </a:gs>
+            </a:gsLst>
+            <a:lin ang="2700000" scaled="1"/>
+            <a:tileRect/>
+          </a:gradFill>
           <a:ln/>
           <a:effectLst>
             <a:outerShdw blurRad="50800" dist="38100" dir="2700000" algn="tl" rotWithShape="0">
@@ -3589,6 +3634,21 @@
           <a:prstGeom prst="roundRect">
             <a:avLst/>
           </a:prstGeom>
+          <a:gradFill flip="none" rotWithShape="1">
+            <a:gsLst>
+              <a:gs pos="0">
+                <a:schemeClr val="accent1">
+                  <a:lumMod val="5000"/>
+                  <a:lumOff val="95000"/>
+                </a:schemeClr>
+              </a:gs>
+              <a:gs pos="100000">
+                <a:srgbClr val="C00000"/>
+              </a:gs>
+            </a:gsLst>
+            <a:lin ang="2700000" scaled="1"/>
+            <a:tileRect/>
+          </a:gradFill>
           <a:ln/>
           <a:effectLst>
             <a:outerShdw blurRad="50800" dist="38100" dir="2700000" algn="tl" rotWithShape="0">
@@ -3648,6 +3708,21 @@
           <a:prstGeom prst="roundRect">
             <a:avLst/>
           </a:prstGeom>
+          <a:gradFill flip="none" rotWithShape="1">
+            <a:gsLst>
+              <a:gs pos="0">
+                <a:schemeClr val="accent1">
+                  <a:lumMod val="5000"/>
+                  <a:lumOff val="95000"/>
+                </a:schemeClr>
+              </a:gs>
+              <a:gs pos="100000">
+                <a:srgbClr val="C00000"/>
+              </a:gs>
+            </a:gsLst>
+            <a:lin ang="2700000" scaled="1"/>
+            <a:tileRect/>
+          </a:gradFill>
           <a:ln/>
           <a:effectLst>
             <a:outerShdw blurRad="50800" dist="38100" dir="2700000" algn="tl" rotWithShape="0">
@@ -3707,6 +3782,21 @@
           <a:prstGeom prst="roundRect">
             <a:avLst/>
           </a:prstGeom>
+          <a:gradFill flip="none" rotWithShape="1">
+            <a:gsLst>
+              <a:gs pos="0">
+                <a:schemeClr val="accent1">
+                  <a:lumMod val="5000"/>
+                  <a:lumOff val="95000"/>
+                </a:schemeClr>
+              </a:gs>
+              <a:gs pos="100000">
+                <a:schemeClr val="accent2"/>
+              </a:gs>
+            </a:gsLst>
+            <a:lin ang="2700000" scaled="1"/>
+            <a:tileRect/>
+          </a:gradFill>
           <a:ln/>
           <a:effectLst>
             <a:outerShdw blurRad="50800" dist="38100" dir="2700000" algn="tl" rotWithShape="0">
@@ -3766,6 +3856,21 @@
           <a:prstGeom prst="roundRect">
             <a:avLst/>
           </a:prstGeom>
+          <a:gradFill flip="none" rotWithShape="1">
+            <a:gsLst>
+              <a:gs pos="0">
+                <a:schemeClr val="accent1">
+                  <a:lumMod val="5000"/>
+                  <a:lumOff val="95000"/>
+                </a:schemeClr>
+              </a:gs>
+              <a:gs pos="100000">
+                <a:schemeClr val="accent2"/>
+              </a:gs>
+            </a:gsLst>
+            <a:lin ang="2700000" scaled="1"/>
+            <a:tileRect/>
+          </a:gradFill>
           <a:ln/>
           <a:effectLst>
             <a:outerShdw blurRad="50800" dist="38100" dir="2700000" algn="tl" rotWithShape="0">
@@ -3825,6 +3930,21 @@
           <a:prstGeom prst="roundRect">
             <a:avLst/>
           </a:prstGeom>
+          <a:gradFill flip="none" rotWithShape="1">
+            <a:gsLst>
+              <a:gs pos="0">
+                <a:schemeClr val="accent1">
+                  <a:lumMod val="5000"/>
+                  <a:lumOff val="95000"/>
+                </a:schemeClr>
+              </a:gs>
+              <a:gs pos="100000">
+                <a:schemeClr val="accent2"/>
+              </a:gs>
+            </a:gsLst>
+            <a:lin ang="2700000" scaled="1"/>
+            <a:tileRect/>
+          </a:gradFill>
           <a:ln/>
           <a:effectLst>
             <a:outerShdw blurRad="50800" dist="38100" dir="2700000" algn="tl" rotWithShape="0">
@@ -3884,6 +4004,21 @@
           <a:prstGeom prst="roundRect">
             <a:avLst/>
           </a:prstGeom>
+          <a:gradFill flip="none" rotWithShape="1">
+            <a:gsLst>
+              <a:gs pos="0">
+                <a:schemeClr val="accent1">
+                  <a:lumMod val="5000"/>
+                  <a:lumOff val="95000"/>
+                </a:schemeClr>
+              </a:gs>
+              <a:gs pos="100000">
+                <a:srgbClr val="92D050"/>
+              </a:gs>
+            </a:gsLst>
+            <a:lin ang="2700000" scaled="1"/>
+            <a:tileRect/>
+          </a:gradFill>
           <a:ln/>
           <a:effectLst>
             <a:outerShdw blurRad="50800" dist="38100" dir="2700000" algn="tl" rotWithShape="0">
@@ -3943,6 +4078,21 @@
           <a:prstGeom prst="roundRect">
             <a:avLst/>
           </a:prstGeom>
+          <a:gradFill flip="none" rotWithShape="1">
+            <a:gsLst>
+              <a:gs pos="0">
+                <a:schemeClr val="accent1">
+                  <a:lumMod val="5000"/>
+                  <a:lumOff val="95000"/>
+                </a:schemeClr>
+              </a:gs>
+              <a:gs pos="100000">
+                <a:srgbClr val="92D050"/>
+              </a:gs>
+            </a:gsLst>
+            <a:lin ang="2700000" scaled="1"/>
+            <a:tileRect/>
+          </a:gradFill>
           <a:ln/>
           <a:effectLst>
             <a:outerShdw blurRad="50800" dist="38100" dir="2700000" algn="tl" rotWithShape="0">
@@ -4013,6 +4163,21 @@
           <a:prstGeom prst="roundRect">
             <a:avLst/>
           </a:prstGeom>
+          <a:gradFill flip="none" rotWithShape="1">
+            <a:gsLst>
+              <a:gs pos="0">
+                <a:schemeClr val="accent1">
+                  <a:lumMod val="5000"/>
+                  <a:lumOff val="95000"/>
+                </a:schemeClr>
+              </a:gs>
+              <a:gs pos="100000">
+                <a:srgbClr val="92D050"/>
+              </a:gs>
+            </a:gsLst>
+            <a:lin ang="2700000" scaled="1"/>
+            <a:tileRect/>
+          </a:gradFill>
           <a:ln/>
           <a:effectLst>
             <a:outerShdw blurRad="50800" dist="38100" dir="2700000" algn="tl" rotWithShape="0">
@@ -4354,6 +4519,21 @@
           <a:prstGeom prst="roundRect">
             <a:avLst/>
           </a:prstGeom>
+          <a:gradFill flip="none" rotWithShape="1">
+            <a:gsLst>
+              <a:gs pos="0">
+                <a:schemeClr val="accent1">
+                  <a:lumMod val="5000"/>
+                  <a:lumOff val="95000"/>
+                </a:schemeClr>
+              </a:gs>
+              <a:gs pos="100000">
+                <a:srgbClr val="00B0F0"/>
+              </a:gs>
+            </a:gsLst>
+            <a:lin ang="2700000" scaled="1"/>
+            <a:tileRect/>
+          </a:gradFill>
           <a:ln/>
           <a:effectLst>
             <a:outerShdw blurRad="50800" dist="38100" dir="2700000" algn="tl" rotWithShape="0">
@@ -4605,6 +4785,21 @@
           <a:prstGeom prst="roundRect">
             <a:avLst/>
           </a:prstGeom>
+          <a:gradFill flip="none" rotWithShape="1">
+            <a:gsLst>
+              <a:gs pos="0">
+                <a:schemeClr val="accent1">
+                  <a:lumMod val="5000"/>
+                  <a:lumOff val="95000"/>
+                </a:schemeClr>
+              </a:gs>
+              <a:gs pos="100000">
+                <a:srgbClr val="92D050"/>
+              </a:gs>
+            </a:gsLst>
+            <a:lin ang="2700000" scaled="1"/>
+            <a:tileRect/>
+          </a:gradFill>
           <a:ln/>
           <a:effectLst>
             <a:outerShdw blurRad="50800" dist="38100" dir="2700000" algn="tl" rotWithShape="0">
@@ -4710,6 +4905,21 @@
           <a:prstGeom prst="roundRect">
             <a:avLst/>
           </a:prstGeom>
+          <a:gradFill flip="none" rotWithShape="1">
+            <a:gsLst>
+              <a:gs pos="0">
+                <a:schemeClr val="accent1">
+                  <a:lumMod val="5000"/>
+                  <a:lumOff val="95000"/>
+                </a:schemeClr>
+              </a:gs>
+              <a:gs pos="100000">
+                <a:srgbClr val="0070C0"/>
+              </a:gs>
+            </a:gsLst>
+            <a:lin ang="2700000" scaled="1"/>
+            <a:tileRect/>
+          </a:gradFill>
           <a:ln/>
           <a:effectLst>
             <a:outerShdw blurRad="50800" dist="38100" dir="2700000" algn="tl" rotWithShape="0">
@@ -4814,6 +5024,21 @@
           <a:prstGeom prst="roundRect">
             <a:avLst/>
           </a:prstGeom>
+          <a:gradFill flip="none" rotWithShape="1">
+            <a:gsLst>
+              <a:gs pos="0">
+                <a:schemeClr val="accent1">
+                  <a:lumMod val="5000"/>
+                  <a:lumOff val="95000"/>
+                </a:schemeClr>
+              </a:gs>
+              <a:gs pos="100000">
+                <a:srgbClr val="C00000"/>
+              </a:gs>
+            </a:gsLst>
+            <a:lin ang="2700000" scaled="1"/>
+            <a:tileRect/>
+          </a:gradFill>
           <a:ln/>
           <a:effectLst>
             <a:outerShdw blurRad="50800" dist="38100" dir="2700000" algn="tl" rotWithShape="0">
@@ -4873,6 +5098,21 @@
           <a:prstGeom prst="roundRect">
             <a:avLst/>
           </a:prstGeom>
+          <a:gradFill flip="none" rotWithShape="1">
+            <a:gsLst>
+              <a:gs pos="0">
+                <a:schemeClr val="accent1">
+                  <a:lumMod val="5000"/>
+                  <a:lumOff val="95000"/>
+                </a:schemeClr>
+              </a:gs>
+              <a:gs pos="100000">
+                <a:srgbClr val="FFFF00"/>
+              </a:gs>
+            </a:gsLst>
+            <a:lin ang="2700000" scaled="1"/>
+            <a:tileRect/>
+          </a:gradFill>
           <a:ln/>
           <a:effectLst>
             <a:outerShdw blurRad="50800" dist="38100" dir="2700000" algn="tl" rotWithShape="0">
@@ -4932,6 +5172,21 @@
           <a:prstGeom prst="roundRect">
             <a:avLst/>
           </a:prstGeom>
+          <a:gradFill flip="none" rotWithShape="1">
+            <a:gsLst>
+              <a:gs pos="0">
+                <a:schemeClr val="accent1">
+                  <a:lumMod val="5000"/>
+                  <a:lumOff val="95000"/>
+                </a:schemeClr>
+              </a:gs>
+              <a:gs pos="100000">
+                <a:srgbClr val="FFFF00"/>
+              </a:gs>
+            </a:gsLst>
+            <a:lin ang="2700000" scaled="1"/>
+            <a:tileRect/>
+          </a:gradFill>
           <a:ln/>
           <a:effectLst>
             <a:outerShdw blurRad="50800" dist="38100" dir="2700000" algn="tl" rotWithShape="0">
@@ -4991,6 +5246,21 @@
           <a:prstGeom prst="roundRect">
             <a:avLst/>
           </a:prstGeom>
+          <a:gradFill flip="none" rotWithShape="1">
+            <a:gsLst>
+              <a:gs pos="0">
+                <a:schemeClr val="accent1">
+                  <a:lumMod val="5000"/>
+                  <a:lumOff val="95000"/>
+                </a:schemeClr>
+              </a:gs>
+              <a:gs pos="100000">
+                <a:srgbClr val="FFFF00"/>
+              </a:gs>
+            </a:gsLst>
+            <a:lin ang="2700000" scaled="1"/>
+            <a:tileRect/>
+          </a:gradFill>
           <a:ln/>
           <a:effectLst>
             <a:outerShdw blurRad="50800" dist="38100" dir="2700000" algn="tl" rotWithShape="0">
@@ -5186,6 +5456,21 @@
           <a:prstGeom prst="roundRect">
             <a:avLst/>
           </a:prstGeom>
+          <a:gradFill flip="none" rotWithShape="1">
+            <a:gsLst>
+              <a:gs pos="0">
+                <a:schemeClr val="accent1">
+                  <a:lumMod val="5000"/>
+                  <a:lumOff val="95000"/>
+                </a:schemeClr>
+              </a:gs>
+              <a:gs pos="100000">
+                <a:srgbClr val="FFFF00"/>
+              </a:gs>
+            </a:gsLst>
+            <a:lin ang="2700000" scaled="1"/>
+            <a:tileRect/>
+          </a:gradFill>
           <a:ln/>
           <a:effectLst>
             <a:outerShdw blurRad="50800" dist="38100" dir="2700000" algn="tl" rotWithShape="0">
@@ -5245,6 +5530,21 @@
           <a:prstGeom prst="roundRect">
             <a:avLst/>
           </a:prstGeom>
+          <a:gradFill flip="none" rotWithShape="1">
+            <a:gsLst>
+              <a:gs pos="0">
+                <a:schemeClr val="accent1">
+                  <a:lumMod val="5000"/>
+                  <a:lumOff val="95000"/>
+                </a:schemeClr>
+              </a:gs>
+              <a:gs pos="100000">
+                <a:srgbClr val="0070C0"/>
+              </a:gs>
+            </a:gsLst>
+            <a:lin ang="2700000" scaled="1"/>
+            <a:tileRect/>
+          </a:gradFill>
           <a:ln/>
           <a:effectLst>
             <a:outerShdw blurRad="50800" dist="38100" dir="2700000" algn="tl" rotWithShape="0">
@@ -5341,6 +5641,116 @@
           </a:fontRef>
         </p:style>
       </p:cxnSp>
+      <p:pic>
+        <p:nvPicPr>
+          <p:cNvPr id="88" name="Picture 87">
+            <a:extLst>
+              <a:ext uri="{FF2B5EF4-FFF2-40B4-BE49-F238E27FC236}">
+                <a16:creationId xmlns:a16="http://schemas.microsoft.com/office/drawing/2014/main" id="{774F5606-4B20-2741-8CD5-845C37897443}"/>
+              </a:ext>
+            </a:extLst>
+          </p:cNvPr>
+          <p:cNvPicPr>
+            <a:picLocks noChangeAspect="1"/>
+          </p:cNvPicPr>
+          <p:nvPr/>
+        </p:nvPicPr>
+        <p:blipFill>
+          <a:blip r:embed="rId2"/>
+          <a:stretch>
+            <a:fillRect/>
+          </a:stretch>
+        </p:blipFill>
+        <p:spPr>
+          <a:xfrm>
+            <a:off x="1238595" y="3401290"/>
+            <a:ext cx="1313413" cy="1313413"/>
+          </a:xfrm>
+          <a:prstGeom prst="rect">
+            <a:avLst/>
+          </a:prstGeom>
+        </p:spPr>
+      </p:pic>
+      <p:pic>
+        <p:nvPicPr>
+          <p:cNvPr id="1026" name="Picture 2" descr="Get Involved: CoderDojo - WeAreTechWomen - Supporting Women in Technology">
+            <a:extLst>
+              <a:ext uri="{FF2B5EF4-FFF2-40B4-BE49-F238E27FC236}">
+                <a16:creationId xmlns:a16="http://schemas.microsoft.com/office/drawing/2014/main" id="{99AD5297-B896-0D4C-9DAF-B4AD8374ADAC}"/>
+              </a:ext>
+            </a:extLst>
+          </p:cNvPr>
+          <p:cNvPicPr>
+            <a:picLocks noChangeAspect="1" noChangeArrowheads="1"/>
+          </p:cNvPicPr>
+          <p:nvPr/>
+        </p:nvPicPr>
+        <p:blipFill rotWithShape="1">
+          <a:blip r:embed="rId3">
+            <a:extLst>
+              <a:ext uri="{28A0092B-C50C-407E-A947-70E740481C1C}">
+                <a14:useLocalDpi xmlns:a14="http://schemas.microsoft.com/office/drawing/2010/main" val="0"/>
+              </a:ext>
+            </a:extLst>
+          </a:blip>
+          <a:srcRect t="33746" b="33527"/>
+          <a:stretch/>
+        </p:blipFill>
+        <p:spPr bwMode="auto">
+          <a:xfrm>
+            <a:off x="8379228" y="2264993"/>
+            <a:ext cx="2011679" cy="658368"/>
+          </a:xfrm>
+          <a:prstGeom prst="rect">
+            <a:avLst/>
+          </a:prstGeom>
+          <a:noFill/>
+          <a:extLst>
+            <a:ext uri="{909E8E84-426E-40DD-AFC4-6F175D3DCCD1}">
+              <a14:hiddenFill xmlns:a14="http://schemas.microsoft.com/office/drawing/2010/main">
+                <a:solidFill>
+                  <a:srgbClr val="FFFFFF"/>
+                </a:solidFill>
+              </a14:hiddenFill>
+            </a:ext>
+          </a:extLst>
+        </p:spPr>
+      </p:pic>
+      <p:sp>
+        <p:nvSpPr>
+          <p:cNvPr id="93" name="TextBox 92">
+            <a:extLst>
+              <a:ext uri="{FF2B5EF4-FFF2-40B4-BE49-F238E27FC236}">
+                <a16:creationId xmlns:a16="http://schemas.microsoft.com/office/drawing/2014/main" id="{703ACE38-48A4-D245-A0AF-3B7AD9BE7949}"/>
+              </a:ext>
+            </a:extLst>
+          </p:cNvPr>
+          <p:cNvSpPr txBox="1"/>
+          <p:nvPr/>
+        </p:nvSpPr>
+        <p:spPr>
+          <a:xfrm>
+            <a:off x="1180407" y="4688378"/>
+            <a:ext cx="1398524" cy="369332"/>
+          </a:xfrm>
+          <a:prstGeom prst="rect">
+            <a:avLst/>
+          </a:prstGeom>
+          <a:noFill/>
+        </p:spPr>
+        <p:txBody>
+          <a:bodyPr wrap="none" rtlCol="0">
+            <a:spAutoFit/>
+          </a:bodyPr>
+          <a:lstStyle/>
+          <a:p>
+            <a:r>
+              <a:rPr lang="en-US" dirty="0"/>
+              <a:t>MicroPython</a:t>
+            </a:r>
+          </a:p>
+        </p:txBody>
+      </p:sp>
     </p:spTree>
     <p:extLst>
       <p:ext uri="{BB962C8B-B14F-4D97-AF65-F5344CB8AC3E}">

</xml_diff>